<commit_message>
sucessed multi monitoring src paths, perhaps
</commit_message>
<xml_diff>
--- a/sample/fig_src/test.pptx
+++ b/sample/fig_src/test.pptx
@@ -252,7 +252,7 @@
           <a:p>
             <a:fld id="{02F9879E-4837-AC4B-90E5-6FE622A70FBA}" type="datetimeFigureOut">
               <a:rPr kumimoji="1" lang="ja-JP" altLang="en-US" smtClean="0"/>
-              <a:t>2020/1/7</a:t>
+              <a:t>2020/1/19</a:t>
             </a:fld>
             <a:endParaRPr kumimoji="1" lang="ja-JP" altLang="en-US"/>
           </a:p>
@@ -452,7 +452,7 @@
           <a:p>
             <a:fld id="{02F9879E-4837-AC4B-90E5-6FE622A70FBA}" type="datetimeFigureOut">
               <a:rPr kumimoji="1" lang="ja-JP" altLang="en-US" smtClean="0"/>
-              <a:t>2020/1/7</a:t>
+              <a:t>2020/1/19</a:t>
             </a:fld>
             <a:endParaRPr kumimoji="1" lang="ja-JP" altLang="en-US"/>
           </a:p>
@@ -662,7 +662,7 @@
           <a:p>
             <a:fld id="{02F9879E-4837-AC4B-90E5-6FE622A70FBA}" type="datetimeFigureOut">
               <a:rPr kumimoji="1" lang="ja-JP" altLang="en-US" smtClean="0"/>
-              <a:t>2020/1/7</a:t>
+              <a:t>2020/1/19</a:t>
             </a:fld>
             <a:endParaRPr kumimoji="1" lang="ja-JP" altLang="en-US"/>
           </a:p>
@@ -862,7 +862,7 @@
           <a:p>
             <a:fld id="{02F9879E-4837-AC4B-90E5-6FE622A70FBA}" type="datetimeFigureOut">
               <a:rPr kumimoji="1" lang="ja-JP" altLang="en-US" smtClean="0"/>
-              <a:t>2020/1/7</a:t>
+              <a:t>2020/1/19</a:t>
             </a:fld>
             <a:endParaRPr kumimoji="1" lang="ja-JP" altLang="en-US"/>
           </a:p>
@@ -1107,7 +1107,7 @@
           <a:p>
             <a:fld id="{02F9879E-4837-AC4B-90E5-6FE622A70FBA}" type="datetimeFigureOut">
               <a:rPr kumimoji="1" lang="ja-JP" altLang="en-US" smtClean="0"/>
-              <a:t>2020/1/7</a:t>
+              <a:t>2020/1/19</a:t>
             </a:fld>
             <a:endParaRPr kumimoji="1" lang="ja-JP" altLang="en-US"/>
           </a:p>
@@ -1400,7 +1400,7 @@
           <a:p>
             <a:fld id="{02F9879E-4837-AC4B-90E5-6FE622A70FBA}" type="datetimeFigureOut">
               <a:rPr kumimoji="1" lang="ja-JP" altLang="en-US" smtClean="0"/>
-              <a:t>2020/1/7</a:t>
+              <a:t>2020/1/19</a:t>
             </a:fld>
             <a:endParaRPr kumimoji="1" lang="ja-JP" altLang="en-US"/>
           </a:p>
@@ -1828,7 +1828,7 @@
           <a:p>
             <a:fld id="{02F9879E-4837-AC4B-90E5-6FE622A70FBA}" type="datetimeFigureOut">
               <a:rPr kumimoji="1" lang="ja-JP" altLang="en-US" smtClean="0"/>
-              <a:t>2020/1/7</a:t>
+              <a:t>2020/1/19</a:t>
             </a:fld>
             <a:endParaRPr kumimoji="1" lang="ja-JP" altLang="en-US"/>
           </a:p>
@@ -1945,7 +1945,7 @@
           <a:p>
             <a:fld id="{02F9879E-4837-AC4B-90E5-6FE622A70FBA}" type="datetimeFigureOut">
               <a:rPr kumimoji="1" lang="ja-JP" altLang="en-US" smtClean="0"/>
-              <a:t>2020/1/7</a:t>
+              <a:t>2020/1/19</a:t>
             </a:fld>
             <a:endParaRPr kumimoji="1" lang="ja-JP" altLang="en-US"/>
           </a:p>
@@ -2040,7 +2040,7 @@
           <a:p>
             <a:fld id="{02F9879E-4837-AC4B-90E5-6FE622A70FBA}" type="datetimeFigureOut">
               <a:rPr kumimoji="1" lang="ja-JP" altLang="en-US" smtClean="0"/>
-              <a:t>2020/1/7</a:t>
+              <a:t>2020/1/19</a:t>
             </a:fld>
             <a:endParaRPr kumimoji="1" lang="ja-JP" altLang="en-US"/>
           </a:p>
@@ -2347,7 +2347,7 @@
           <a:p>
             <a:fld id="{02F9879E-4837-AC4B-90E5-6FE622A70FBA}" type="datetimeFigureOut">
               <a:rPr kumimoji="1" lang="ja-JP" altLang="en-US" smtClean="0"/>
-              <a:t>2020/1/7</a:t>
+              <a:t>2020/1/19</a:t>
             </a:fld>
             <a:endParaRPr kumimoji="1" lang="ja-JP" altLang="en-US"/>
           </a:p>
@@ -2599,7 +2599,7 @@
           <a:p>
             <a:fld id="{02F9879E-4837-AC4B-90E5-6FE622A70FBA}" type="datetimeFigureOut">
               <a:rPr kumimoji="1" lang="ja-JP" altLang="en-US" smtClean="0"/>
-              <a:t>2020/1/7</a:t>
+              <a:t>2020/1/19</a:t>
             </a:fld>
             <a:endParaRPr kumimoji="1" lang="ja-JP" altLang="en-US"/>
           </a:p>
@@ -2842,7 +2842,7 @@
           <a:p>
             <a:fld id="{02F9879E-4837-AC4B-90E5-6FE622A70FBA}" type="datetimeFigureOut">
               <a:rPr kumimoji="1" lang="ja-JP" altLang="en-US" smtClean="0"/>
-              <a:t>2020/1/7</a:t>
+              <a:t>2020/1/19</a:t>
             </a:fld>
             <a:endParaRPr kumimoji="1" lang="ja-JP" altLang="en-US"/>
           </a:p>

</xml_diff>